<commit_message>
Updates to include determination of OAT (Outside Air Temperature)
git-svn-id: http://svn.eol.ucar.edu/svn/raf/trunk/instruments/mtp@7792 640d5228-2204-0410-8d71-8f46fa6850b4
</commit_message>
<xml_diff>
--- a/doc/MTP-DFD.pptx
+++ b/doc/MTP-DFD.pptx
@@ -305,7 +305,7 @@
           <a:p>
             <a:fld id="{3A6CA703-A109-4933-88E3-8D2081F29780}" type="datetimeFigureOut">
               <a:rPr lang="en-US" smtClean="0"/>
-              <a:t>3/2/2015</a:t>
+              <a:t>3/19/2015</a:t>
             </a:fld>
             <a:endParaRPr lang="en-US"/>
           </a:p>
@@ -475,7 +475,7 @@
           <a:p>
             <a:fld id="{3A6CA703-A109-4933-88E3-8D2081F29780}" type="datetimeFigureOut">
               <a:rPr lang="en-US" smtClean="0"/>
-              <a:t>3/2/2015</a:t>
+              <a:t>3/19/2015</a:t>
             </a:fld>
             <a:endParaRPr lang="en-US"/>
           </a:p>
@@ -655,7 +655,7 @@
           <a:p>
             <a:fld id="{3A6CA703-A109-4933-88E3-8D2081F29780}" type="datetimeFigureOut">
               <a:rPr lang="en-US" smtClean="0"/>
-              <a:t>3/2/2015</a:t>
+              <a:t>3/19/2015</a:t>
             </a:fld>
             <a:endParaRPr lang="en-US"/>
           </a:p>
@@ -825,7 +825,7 @@
           <a:p>
             <a:fld id="{3A6CA703-A109-4933-88E3-8D2081F29780}" type="datetimeFigureOut">
               <a:rPr lang="en-US" smtClean="0"/>
-              <a:t>3/2/2015</a:t>
+              <a:t>3/19/2015</a:t>
             </a:fld>
             <a:endParaRPr lang="en-US"/>
           </a:p>
@@ -1071,7 +1071,7 @@
           <a:p>
             <a:fld id="{3A6CA703-A109-4933-88E3-8D2081F29780}" type="datetimeFigureOut">
               <a:rPr lang="en-US" smtClean="0"/>
-              <a:t>3/2/2015</a:t>
+              <a:t>3/19/2015</a:t>
             </a:fld>
             <a:endParaRPr lang="en-US"/>
           </a:p>
@@ -1359,7 +1359,7 @@
           <a:p>
             <a:fld id="{3A6CA703-A109-4933-88E3-8D2081F29780}" type="datetimeFigureOut">
               <a:rPr lang="en-US" smtClean="0"/>
-              <a:t>3/2/2015</a:t>
+              <a:t>3/19/2015</a:t>
             </a:fld>
             <a:endParaRPr lang="en-US"/>
           </a:p>
@@ -1781,7 +1781,7 @@
           <a:p>
             <a:fld id="{3A6CA703-A109-4933-88E3-8D2081F29780}" type="datetimeFigureOut">
               <a:rPr lang="en-US" smtClean="0"/>
-              <a:t>3/2/2015</a:t>
+              <a:t>3/19/2015</a:t>
             </a:fld>
             <a:endParaRPr lang="en-US"/>
           </a:p>
@@ -1899,7 +1899,7 @@
           <a:p>
             <a:fld id="{3A6CA703-A109-4933-88E3-8D2081F29780}" type="datetimeFigureOut">
               <a:rPr lang="en-US" smtClean="0"/>
-              <a:t>3/2/2015</a:t>
+              <a:t>3/19/2015</a:t>
             </a:fld>
             <a:endParaRPr lang="en-US"/>
           </a:p>
@@ -1994,7 +1994,7 @@
           <a:p>
             <a:fld id="{3A6CA703-A109-4933-88E3-8D2081F29780}" type="datetimeFigureOut">
               <a:rPr lang="en-US" smtClean="0"/>
-              <a:t>3/2/2015</a:t>
+              <a:t>3/19/2015</a:t>
             </a:fld>
             <a:endParaRPr lang="en-US"/>
           </a:p>
@@ -2271,7 +2271,7 @@
           <a:p>
             <a:fld id="{3A6CA703-A109-4933-88E3-8D2081F29780}" type="datetimeFigureOut">
               <a:rPr lang="en-US" smtClean="0"/>
-              <a:t>3/2/2015</a:t>
+              <a:t>3/19/2015</a:t>
             </a:fld>
             <a:endParaRPr lang="en-US"/>
           </a:p>
@@ -2524,7 +2524,7 @@
           <a:p>
             <a:fld id="{3A6CA703-A109-4933-88E3-8D2081F29780}" type="datetimeFigureOut">
               <a:rPr lang="en-US" smtClean="0"/>
-              <a:t>3/2/2015</a:t>
+              <a:t>3/19/2015</a:t>
             </a:fld>
             <a:endParaRPr lang="en-US"/>
           </a:p>
@@ -2737,7 +2737,7 @@
           <a:p>
             <a:fld id="{3A6CA703-A109-4933-88E3-8D2081F29780}" type="datetimeFigureOut">
               <a:rPr lang="en-US" smtClean="0"/>
-              <a:t>3/2/2015</a:t>
+              <a:t>3/19/2015</a:t>
             </a:fld>
             <a:endParaRPr lang="en-US"/>
           </a:p>
@@ -5734,6 +5734,836 @@
           <a:chExt cx="0" cy="0"/>
         </a:xfrm>
       </p:grpSpPr>
+      <p:sp>
+        <p:nvSpPr>
+          <p:cNvPr id="2" name="TextBox 1"/>
+          <p:cNvSpPr txBox="1"/>
+          <p:nvPr/>
+        </p:nvSpPr>
+        <p:spPr>
+          <a:xfrm>
+            <a:off x="8725296" y="0"/>
+            <a:ext cx="418704" cy="369332"/>
+          </a:xfrm>
+          <a:prstGeom prst="rect">
+            <a:avLst/>
+          </a:prstGeom>
+          <a:noFill/>
+        </p:spPr>
+        <p:txBody>
+          <a:bodyPr wrap="none" rtlCol="0">
+            <a:spAutoFit/>
+          </a:bodyPr>
+          <a:lstStyle/>
+          <a:p>
+            <a:r>
+              <a:rPr lang="en-US" dirty="0" smtClean="0"/>
+              <a:t>21</a:t>
+            </a:r>
+          </a:p>
+        </p:txBody>
+      </p:sp>
+      <p:sp>
+        <p:nvSpPr>
+          <p:cNvPr id="3" name="Rectangle 2"/>
+          <p:cNvSpPr/>
+          <p:nvPr/>
+        </p:nvSpPr>
+        <p:spPr>
+          <a:xfrm>
+            <a:off x="1676400" y="5097257"/>
+            <a:ext cx="6096000" cy="1754326"/>
+          </a:xfrm>
+          <a:prstGeom prst="rect">
+            <a:avLst/>
+          </a:prstGeom>
+          <a:ln w="6350">
+            <a:solidFill>
+              <a:schemeClr val="tx1"/>
+            </a:solidFill>
+          </a:ln>
+        </p:spPr>
+        <p:txBody>
+          <a:bodyPr wrap="square">
+            <a:spAutoFit/>
+          </a:bodyPr>
+          <a:lstStyle/>
+          <a:p>
+            <a:r>
+              <a:rPr lang="en-US" dirty="0"/>
+              <a:t> </a:t>
+            </a:r>
+            <a:r>
+              <a:rPr lang="en-US" dirty="0" smtClean="0"/>
+              <a:t>from: </a:t>
+            </a:r>
+            <a:r>
+              <a:rPr lang="en-US" dirty="0" err="1" smtClean="0"/>
+              <a:t>MTPbin:fGetNavT</a:t>
+            </a:r>
+            <a:endParaRPr lang="en-US" dirty="0" smtClean="0"/>
+          </a:p>
+          <a:p>
+            <a:r>
+              <a:rPr lang="en-US" dirty="0"/>
+              <a:t> </a:t>
+            </a:r>
+            <a:r>
+              <a:rPr lang="en-US" dirty="0" smtClean="0"/>
+              <a:t> n </a:t>
+            </a:r>
+            <a:r>
+              <a:rPr lang="en-US" dirty="0"/>
+              <a:t>= </a:t>
+            </a:r>
+            <a:r>
+              <a:rPr lang="en-US" dirty="0" err="1"/>
+              <a:t>Int</a:t>
+            </a:r>
+            <a:r>
+              <a:rPr lang="en-US" dirty="0"/>
+              <a:t>(</a:t>
+            </a:r>
+            <a:r>
+              <a:rPr lang="en-US" dirty="0" err="1"/>
+              <a:t>aNAVoffset</a:t>
+            </a:r>
+            <a:r>
+              <a:rPr lang="en-US" dirty="0"/>
+              <a:t>(C))</a:t>
+            </a:r>
+          </a:p>
+          <a:p>
+            <a:r>
+              <a:rPr lang="en-US" dirty="0"/>
+              <a:t>  If </a:t>
+            </a:r>
+            <a:r>
+              <a:rPr lang="en-US" dirty="0" err="1"/>
+              <a:t>aNAVoffset</a:t>
+            </a:r>
+            <a:r>
+              <a:rPr lang="en-US" dirty="0"/>
+              <a:t>(C) - n &lt;&gt; 0 Then  'Interpolate</a:t>
+            </a:r>
+          </a:p>
+          <a:p>
+            <a:r>
+              <a:rPr lang="en-US" dirty="0"/>
+              <a:t>    OAT1 = OATV(1, </a:t>
+            </a:r>
+            <a:r>
+              <a:rPr lang="en-US" dirty="0" err="1"/>
+              <a:t>fRecordCheck</a:t>
+            </a:r>
+            <a:r>
+              <a:rPr lang="en-US" dirty="0"/>
+              <a:t>(Record, n))</a:t>
+            </a:r>
+          </a:p>
+          <a:p>
+            <a:r>
+              <a:rPr lang="en-US" dirty="0"/>
+              <a:t>    OAT2 = OATV(1, </a:t>
+            </a:r>
+            <a:r>
+              <a:rPr lang="en-US" dirty="0" err="1"/>
+              <a:t>fRecordCheck</a:t>
+            </a:r>
+            <a:r>
+              <a:rPr lang="en-US" dirty="0"/>
+              <a:t>(Record, n + 1))</a:t>
+            </a:r>
+          </a:p>
+          <a:p>
+            <a:r>
+              <a:rPr lang="en-US" dirty="0"/>
+              <a:t>    OAT = OAT1 + (OAT2 - OAT1) * (</a:t>
+            </a:r>
+            <a:r>
+              <a:rPr lang="en-US" dirty="0" err="1"/>
+              <a:t>aNAVoffset</a:t>
+            </a:r>
+            <a:r>
+              <a:rPr lang="en-US" dirty="0"/>
+              <a:t>(C) - n)</a:t>
+            </a:r>
+          </a:p>
+        </p:txBody>
+      </p:sp>
+      <p:cxnSp>
+        <p:nvCxnSpPr>
+          <p:cNvPr id="4" name="Straight Arrow Connector 3"/>
+          <p:cNvCxnSpPr/>
+          <p:nvPr/>
+        </p:nvCxnSpPr>
+        <p:spPr>
+          <a:xfrm flipH="1" flipV="1">
+            <a:off x="378315" y="4724400"/>
+            <a:ext cx="2593487" cy="1250020"/>
+          </a:xfrm>
+          <a:prstGeom prst="straightConnector1">
+            <a:avLst/>
+          </a:prstGeom>
+          <a:ln>
+            <a:tailEnd type="arrow"/>
+          </a:ln>
+        </p:spPr>
+        <p:style>
+          <a:lnRef idx="1">
+            <a:schemeClr val="accent1"/>
+          </a:lnRef>
+          <a:fillRef idx="0">
+            <a:schemeClr val="accent1"/>
+          </a:fillRef>
+          <a:effectRef idx="0">
+            <a:schemeClr val="accent1"/>
+          </a:effectRef>
+          <a:fontRef idx="minor">
+            <a:schemeClr val="tx1"/>
+          </a:fontRef>
+        </p:style>
+      </p:cxnSp>
+      <p:sp>
+        <p:nvSpPr>
+          <p:cNvPr id="6" name="Rectangle 5"/>
+          <p:cNvSpPr/>
+          <p:nvPr/>
+        </p:nvSpPr>
+        <p:spPr>
+          <a:xfrm>
+            <a:off x="149713" y="4160980"/>
+            <a:ext cx="2533514" cy="646331"/>
+          </a:xfrm>
+          <a:prstGeom prst="rect">
+            <a:avLst/>
+          </a:prstGeom>
+          <a:ln w="6350">
+            <a:solidFill>
+              <a:schemeClr val="tx1"/>
+            </a:solidFill>
+          </a:ln>
+        </p:spPr>
+        <p:txBody>
+          <a:bodyPr wrap="none">
+            <a:spAutoFit/>
+          </a:bodyPr>
+          <a:lstStyle/>
+          <a:p>
+            <a:r>
+              <a:rPr lang="en-US" dirty="0" smtClean="0"/>
+              <a:t>From </a:t>
+            </a:r>
+            <a:r>
+              <a:rPr lang="en-US" dirty="0" err="1" smtClean="0"/>
+              <a:t>MTPbin:WriteArray</a:t>
+            </a:r>
+            <a:endParaRPr lang="en-US" dirty="0" smtClean="0"/>
+          </a:p>
+          <a:p>
+            <a:r>
+              <a:rPr lang="en-US" dirty="0" smtClean="0"/>
+              <a:t> </a:t>
+            </a:r>
+            <a:r>
+              <a:rPr lang="en-US" dirty="0"/>
+              <a:t>OATV(1, r) = </a:t>
+            </a:r>
+            <a:r>
+              <a:rPr lang="en-US" dirty="0" err="1"/>
+              <a:t>OATnav</a:t>
+            </a:r>
+            <a:endParaRPr lang="en-US" dirty="0"/>
+          </a:p>
+        </p:txBody>
+      </p:sp>
+      <p:sp>
+        <p:nvSpPr>
+          <p:cNvPr id="7" name="Rectangle 6"/>
+          <p:cNvSpPr/>
+          <p:nvPr/>
+        </p:nvSpPr>
+        <p:spPr>
+          <a:xfrm>
+            <a:off x="73513" y="3082164"/>
+            <a:ext cx="2961965" cy="646331"/>
+          </a:xfrm>
+          <a:prstGeom prst="rect">
+            <a:avLst/>
+          </a:prstGeom>
+          <a:ln w="6350">
+            <a:solidFill>
+              <a:schemeClr val="tx1"/>
+            </a:solidFill>
+          </a:ln>
+        </p:spPr>
+        <p:txBody>
+          <a:bodyPr wrap="none">
+            <a:spAutoFit/>
+          </a:bodyPr>
+          <a:lstStyle/>
+          <a:p>
+            <a:r>
+              <a:rPr lang="en-US" dirty="0" smtClean="0"/>
+              <a:t>From </a:t>
+            </a:r>
+            <a:r>
+              <a:rPr lang="en-US" dirty="0" err="1" smtClean="0"/>
+              <a:t>MTPbin:MapGVtoOther</a:t>
+            </a:r>
+            <a:endParaRPr lang="en-US" dirty="0" smtClean="0"/>
+          </a:p>
+          <a:p>
+            <a:r>
+              <a:rPr lang="en-US" dirty="0" smtClean="0"/>
+              <a:t> </a:t>
+            </a:r>
+            <a:r>
+              <a:rPr lang="en-US" dirty="0" err="1"/>
+              <a:t>OATnav</a:t>
+            </a:r>
+            <a:r>
+              <a:rPr lang="en-US" dirty="0"/>
+              <a:t> = </a:t>
+            </a:r>
+            <a:r>
+              <a:rPr lang="en-US" dirty="0" err="1"/>
+              <a:t>OATnavI</a:t>
+            </a:r>
+            <a:endParaRPr lang="en-US" dirty="0"/>
+          </a:p>
+        </p:txBody>
+      </p:sp>
+      <p:cxnSp>
+        <p:nvCxnSpPr>
+          <p:cNvPr id="8" name="Straight Arrow Connector 7"/>
+          <p:cNvCxnSpPr/>
+          <p:nvPr/>
+        </p:nvCxnSpPr>
+        <p:spPr>
+          <a:xfrm flipH="1" flipV="1">
+            <a:off x="378315" y="3728495"/>
+            <a:ext cx="1295400" cy="832289"/>
+          </a:xfrm>
+          <a:prstGeom prst="straightConnector1">
+            <a:avLst/>
+          </a:prstGeom>
+          <a:ln>
+            <a:tailEnd type="arrow"/>
+          </a:ln>
+        </p:spPr>
+        <p:style>
+          <a:lnRef idx="1">
+            <a:schemeClr val="accent1"/>
+          </a:lnRef>
+          <a:fillRef idx="0">
+            <a:schemeClr val="accent1"/>
+          </a:fillRef>
+          <a:effectRef idx="0">
+            <a:schemeClr val="accent1"/>
+          </a:effectRef>
+          <a:fontRef idx="minor">
+            <a:schemeClr val="tx1"/>
+          </a:fontRef>
+        </p:style>
+      </p:cxnSp>
+      <p:sp>
+        <p:nvSpPr>
+          <p:cNvPr id="10" name="Rectangle 9"/>
+          <p:cNvSpPr/>
+          <p:nvPr/>
+        </p:nvSpPr>
+        <p:spPr>
+          <a:xfrm>
+            <a:off x="80732" y="2015364"/>
+            <a:ext cx="3636060" cy="646331"/>
+          </a:xfrm>
+          <a:prstGeom prst="rect">
+            <a:avLst/>
+          </a:prstGeom>
+          <a:ln w="6350">
+            <a:solidFill>
+              <a:schemeClr val="tx1"/>
+            </a:solidFill>
+          </a:ln>
+        </p:spPr>
+        <p:txBody>
+          <a:bodyPr wrap="none">
+            <a:spAutoFit/>
+          </a:bodyPr>
+          <a:lstStyle/>
+          <a:p>
+            <a:r>
+              <a:rPr lang="en-US" dirty="0" smtClean="0"/>
+              <a:t>From </a:t>
+            </a:r>
+            <a:r>
+              <a:rPr lang="en-US" dirty="0" err="1" smtClean="0"/>
+              <a:t>MTPbin:MapDatV</a:t>
+            </a:r>
+            <a:endParaRPr lang="en-US" dirty="0" smtClean="0"/>
+          </a:p>
+          <a:p>
+            <a:r>
+              <a:rPr lang="en-US" dirty="0" smtClean="0"/>
+              <a:t> </a:t>
+            </a:r>
+            <a:r>
+              <a:rPr lang="en-US" dirty="0" err="1"/>
+              <a:t>OATnavI</a:t>
+            </a:r>
+            <a:r>
+              <a:rPr lang="en-US" dirty="0"/>
+              <a:t> = </a:t>
+            </a:r>
+            <a:r>
+              <a:rPr lang="en-US" dirty="0" err="1"/>
+              <a:t>OATnI</a:t>
+            </a:r>
+            <a:r>
+              <a:rPr lang="en-US" dirty="0"/>
+              <a:t> + 273.15                'K</a:t>
+            </a:r>
+          </a:p>
+        </p:txBody>
+      </p:sp>
+      <p:cxnSp>
+        <p:nvCxnSpPr>
+          <p:cNvPr id="11" name="Straight Arrow Connector 10"/>
+          <p:cNvCxnSpPr/>
+          <p:nvPr/>
+        </p:nvCxnSpPr>
+        <p:spPr>
+          <a:xfrm flipH="1" flipV="1">
+            <a:off x="371896" y="2661695"/>
+            <a:ext cx="1295400" cy="832289"/>
+          </a:xfrm>
+          <a:prstGeom prst="straightConnector1">
+            <a:avLst/>
+          </a:prstGeom>
+          <a:ln>
+            <a:tailEnd type="arrow"/>
+          </a:ln>
+        </p:spPr>
+        <p:style>
+          <a:lnRef idx="1">
+            <a:schemeClr val="accent1"/>
+          </a:lnRef>
+          <a:fillRef idx="0">
+            <a:schemeClr val="accent1"/>
+          </a:fillRef>
+          <a:effectRef idx="0">
+            <a:schemeClr val="accent1"/>
+          </a:effectRef>
+          <a:fontRef idx="minor">
+            <a:schemeClr val="tx1"/>
+          </a:fontRef>
+        </p:style>
+      </p:cxnSp>
+      <p:sp>
+        <p:nvSpPr>
+          <p:cNvPr id="12" name="Rectangle 11"/>
+          <p:cNvSpPr/>
+          <p:nvPr/>
+        </p:nvSpPr>
+        <p:spPr>
+          <a:xfrm>
+            <a:off x="80732" y="1088494"/>
+            <a:ext cx="3287951" cy="646331"/>
+          </a:xfrm>
+          <a:prstGeom prst="rect">
+            <a:avLst/>
+          </a:prstGeom>
+          <a:ln w="6350">
+            <a:solidFill>
+              <a:schemeClr val="tx1"/>
+            </a:solidFill>
+          </a:ln>
+        </p:spPr>
+        <p:txBody>
+          <a:bodyPr wrap="none">
+            <a:spAutoFit/>
+          </a:bodyPr>
+          <a:lstStyle/>
+          <a:p>
+            <a:r>
+              <a:rPr lang="en-US" dirty="0" smtClean="0"/>
+              <a:t>From </a:t>
+            </a:r>
+            <a:r>
+              <a:rPr lang="en-US" dirty="0" err="1" smtClean="0"/>
+              <a:t>MTPbin:mapDatV</a:t>
+            </a:r>
+            <a:endParaRPr lang="en-US" dirty="0" smtClean="0"/>
+          </a:p>
+          <a:p>
+            <a:r>
+              <a:rPr lang="en-US" dirty="0" smtClean="0"/>
+              <a:t>Case </a:t>
+            </a:r>
+            <a:r>
+              <a:rPr lang="en-US" dirty="0"/>
+              <a:t>(20): </a:t>
+            </a:r>
+            <a:r>
+              <a:rPr lang="en-US" dirty="0" err="1"/>
+              <a:t>OATnI</a:t>
+            </a:r>
+            <a:r>
+              <a:rPr lang="en-US" dirty="0"/>
+              <a:t> = </a:t>
+            </a:r>
+            <a:r>
+              <a:rPr lang="en-US" dirty="0" err="1"/>
+              <a:t>DatV</a:t>
+            </a:r>
+            <a:r>
+              <a:rPr lang="en-US" dirty="0"/>
+              <a:t>(</a:t>
+            </a:r>
+            <a:r>
+              <a:rPr lang="en-US" dirty="0" err="1"/>
+              <a:t>i</a:t>
+            </a:r>
+            <a:r>
+              <a:rPr lang="en-US" dirty="0"/>
+              <a:t>)          'C</a:t>
+            </a:r>
+          </a:p>
+        </p:txBody>
+      </p:sp>
+      <p:cxnSp>
+        <p:nvCxnSpPr>
+          <p:cNvPr id="13" name="Straight Arrow Connector 12"/>
+          <p:cNvCxnSpPr/>
+          <p:nvPr/>
+        </p:nvCxnSpPr>
+        <p:spPr>
+          <a:xfrm flipH="1" flipV="1">
+            <a:off x="1416470" y="1734825"/>
+            <a:ext cx="28643" cy="696684"/>
+          </a:xfrm>
+          <a:prstGeom prst="straightConnector1">
+            <a:avLst/>
+          </a:prstGeom>
+          <a:ln>
+            <a:tailEnd type="arrow"/>
+          </a:ln>
+        </p:spPr>
+        <p:style>
+          <a:lnRef idx="1">
+            <a:schemeClr val="accent1"/>
+          </a:lnRef>
+          <a:fillRef idx="0">
+            <a:schemeClr val="accent1"/>
+          </a:fillRef>
+          <a:effectRef idx="0">
+            <a:schemeClr val="accent1"/>
+          </a:effectRef>
+          <a:fontRef idx="minor">
+            <a:schemeClr val="tx1"/>
+          </a:fontRef>
+        </p:style>
+      </p:cxnSp>
+      <p:cxnSp>
+        <p:nvCxnSpPr>
+          <p:cNvPr id="16" name="Straight Arrow Connector 15"/>
+          <p:cNvCxnSpPr/>
+          <p:nvPr/>
+        </p:nvCxnSpPr>
+        <p:spPr>
+          <a:xfrm flipH="1" flipV="1">
+            <a:off x="371896" y="398320"/>
+            <a:ext cx="1692274" cy="1106319"/>
+          </a:xfrm>
+          <a:prstGeom prst="straightConnector1">
+            <a:avLst/>
+          </a:prstGeom>
+          <a:ln>
+            <a:tailEnd type="arrow"/>
+          </a:ln>
+        </p:spPr>
+        <p:style>
+          <a:lnRef idx="1">
+            <a:schemeClr val="accent1"/>
+          </a:lnRef>
+          <a:fillRef idx="0">
+            <a:schemeClr val="accent1"/>
+          </a:fillRef>
+          <a:effectRef idx="0">
+            <a:schemeClr val="accent1"/>
+          </a:effectRef>
+          <a:fontRef idx="minor">
+            <a:schemeClr val="tx1"/>
+          </a:fontRef>
+        </p:style>
+      </p:cxnSp>
+      <p:sp>
+        <p:nvSpPr>
+          <p:cNvPr id="17" name="TextBox 16"/>
+          <p:cNvSpPr txBox="1"/>
+          <p:nvPr/>
+        </p:nvSpPr>
+        <p:spPr>
+          <a:xfrm>
+            <a:off x="216245" y="197223"/>
+            <a:ext cx="3566233" cy="646331"/>
+          </a:xfrm>
+          <a:prstGeom prst="rect">
+            <a:avLst/>
+          </a:prstGeom>
+          <a:noFill/>
+          <a:ln w="6350">
+            <a:solidFill>
+              <a:schemeClr val="tx1"/>
+            </a:solidFill>
+          </a:ln>
+        </p:spPr>
+        <p:txBody>
+          <a:bodyPr wrap="none" rtlCol="0">
+            <a:spAutoFit/>
+          </a:bodyPr>
+          <a:lstStyle/>
+          <a:p>
+            <a:r>
+              <a:rPr lang="en-US" dirty="0" smtClean="0"/>
+              <a:t>Ambient Temperature from </a:t>
+            </a:r>
+            <a:r>
+              <a:rPr lang="en-US" dirty="0" smtClean="0"/>
+              <a:t>IWG1 at</a:t>
+            </a:r>
+          </a:p>
+          <a:p>
+            <a:r>
+              <a:rPr lang="en-US" dirty="0"/>
+              <a:t> </a:t>
+            </a:r>
+            <a:r>
+              <a:rPr lang="en-US" dirty="0" smtClean="0"/>
+              <a:t> time of scan</a:t>
+            </a:r>
+            <a:endParaRPr lang="en-US" dirty="0"/>
+          </a:p>
+        </p:txBody>
+      </p:sp>
+      <p:cxnSp>
+        <p:nvCxnSpPr>
+          <p:cNvPr id="18" name="Straight Arrow Connector 17"/>
+          <p:cNvCxnSpPr/>
+          <p:nvPr/>
+        </p:nvCxnSpPr>
+        <p:spPr>
+          <a:xfrm flipH="1" flipV="1">
+            <a:off x="4114800" y="951479"/>
+            <a:ext cx="1385428" cy="5556341"/>
+          </a:xfrm>
+          <a:prstGeom prst="straightConnector1">
+            <a:avLst/>
+          </a:prstGeom>
+          <a:ln>
+            <a:tailEnd type="arrow"/>
+          </a:ln>
+        </p:spPr>
+        <p:style>
+          <a:lnRef idx="1">
+            <a:schemeClr val="accent1"/>
+          </a:lnRef>
+          <a:fillRef idx="0">
+            <a:schemeClr val="accent1"/>
+          </a:fillRef>
+          <a:effectRef idx="0">
+            <a:schemeClr val="accent1"/>
+          </a:effectRef>
+          <a:fontRef idx="minor">
+            <a:schemeClr val="tx1"/>
+          </a:fontRef>
+        </p:style>
+      </p:cxnSp>
+      <p:sp>
+        <p:nvSpPr>
+          <p:cNvPr id="20" name="Rectangle 19"/>
+          <p:cNvSpPr/>
+          <p:nvPr/>
+        </p:nvSpPr>
+        <p:spPr>
+          <a:xfrm>
+            <a:off x="3891746" y="590466"/>
+            <a:ext cx="5110163" cy="3970318"/>
+          </a:xfrm>
+          <a:prstGeom prst="rect">
+            <a:avLst/>
+          </a:prstGeom>
+          <a:noFill/>
+          <a:ln w="6350">
+            <a:solidFill>
+              <a:schemeClr val="tx1"/>
+            </a:solidFill>
+          </a:ln>
+        </p:spPr>
+        <p:txBody>
+          <a:bodyPr wrap="square">
+            <a:spAutoFit/>
+          </a:bodyPr>
+          <a:lstStyle/>
+          <a:p>
+            <a:r>
+              <a:rPr lang="en-US" dirty="0" smtClean="0"/>
+              <a:t>From file: MTP\Data\{</a:t>
+            </a:r>
+            <a:r>
+              <a:rPr lang="en-US" dirty="0" err="1" smtClean="0"/>
+              <a:t>proj</a:t>
+            </a:r>
+            <a:r>
+              <a:rPr lang="en-US" dirty="0" smtClean="0"/>
+              <a:t>}\{</a:t>
+            </a:r>
+            <a:r>
+              <a:rPr lang="en-US" dirty="0" err="1" smtClean="0"/>
+              <a:t>fltdate</a:t>
+            </a:r>
+            <a:r>
+              <a:rPr lang="en-US" dirty="0" smtClean="0"/>
+              <a:t>}\NG{</a:t>
+            </a:r>
+            <a:r>
+              <a:rPr lang="en-US" dirty="0" err="1" smtClean="0"/>
+              <a:t>fltdate</a:t>
+            </a:r>
+            <a:r>
+              <a:rPr lang="en-US" dirty="0" smtClean="0"/>
+              <a:t>}.REF</a:t>
+            </a:r>
+            <a:endParaRPr lang="en-US" dirty="0" smtClean="0"/>
+          </a:p>
+          <a:p>
+            <a:r>
+              <a:rPr lang="en-US" dirty="0" err="1" smtClean="0"/>
+              <a:t>aNAVoffset</a:t>
+            </a:r>
+            <a:r>
+              <a:rPr lang="en-US" dirty="0" smtClean="0"/>
+              <a:t>(0 </a:t>
+            </a:r>
+            <a:r>
+              <a:rPr lang="en-US" dirty="0"/>
+              <a:t>To 3) As Single       'OAT cycle </a:t>
+            </a:r>
+            <a:r>
+              <a:rPr lang="en-US" dirty="0" smtClean="0"/>
+              <a:t>shift</a:t>
+            </a:r>
+          </a:p>
+          <a:p>
+            <a:endParaRPr lang="en-US" dirty="0"/>
+          </a:p>
+          <a:p>
+            <a:r>
+              <a:rPr lang="en-US" dirty="0" smtClean="0"/>
+              <a:t>Always uses the average ~ (-0.14 to -0.18)</a:t>
+            </a:r>
+          </a:p>
+          <a:p>
+            <a:r>
+              <a:rPr lang="en-US" dirty="0"/>
+              <a:t> </a:t>
+            </a:r>
+            <a:r>
+              <a:rPr lang="en-US" dirty="0" smtClean="0"/>
+              <a:t>- gives Temp 13-15 seconds “ahead” of plane</a:t>
+            </a:r>
+          </a:p>
+          <a:p>
+            <a:r>
+              <a:rPr lang="en-US" dirty="0"/>
+              <a:t> </a:t>
+            </a:r>
+            <a:r>
+              <a:rPr lang="en-US" dirty="0" smtClean="0"/>
+              <a:t>  * at 295 m/s = ~4km</a:t>
+            </a:r>
+          </a:p>
+          <a:p>
+            <a:endParaRPr lang="en-US" dirty="0"/>
+          </a:p>
+          <a:p>
+            <a:r>
+              <a:rPr lang="en-US" dirty="0" smtClean="0"/>
+              <a:t>Odd that the individual channels seem to range </a:t>
+            </a:r>
+          </a:p>
+          <a:p>
+            <a:r>
+              <a:rPr lang="en-US" dirty="0" smtClean="0"/>
+              <a:t>From -0.1 to -0.2 meaning that they range in </a:t>
+            </a:r>
+          </a:p>
+          <a:p>
+            <a:r>
+              <a:rPr lang="en-US" dirty="0" smtClean="0"/>
+              <a:t>Distance 4.5km to  4.0km  thought that they were </a:t>
+            </a:r>
+          </a:p>
+          <a:p>
+            <a:r>
+              <a:rPr lang="en-US" dirty="0" smtClean="0"/>
+              <a:t>Larger range than that…</a:t>
+            </a:r>
+          </a:p>
+          <a:p>
+            <a:endParaRPr lang="en-US" dirty="0"/>
+          </a:p>
+          <a:p>
+            <a:r>
+              <a:rPr lang="en-US" dirty="0" smtClean="0"/>
+              <a:t>Seems like we want to pick a second.  And have OAT </a:t>
+            </a:r>
+          </a:p>
+          <a:p>
+            <a:r>
+              <a:rPr lang="en-US" dirty="0" smtClean="0"/>
+              <a:t>On a per channel basis!</a:t>
+            </a:r>
+            <a:endParaRPr lang="en-US" dirty="0"/>
+          </a:p>
+        </p:txBody>
+      </p:sp>
+      <p:cxnSp>
+        <p:nvCxnSpPr>
+          <p:cNvPr id="22" name="Straight Connector 21"/>
+          <p:cNvCxnSpPr/>
+          <p:nvPr/>
+        </p:nvCxnSpPr>
+        <p:spPr>
+          <a:xfrm>
+            <a:off x="3841970" y="105188"/>
+            <a:ext cx="0" cy="4953000"/>
+          </a:xfrm>
+          <a:prstGeom prst="line">
+            <a:avLst/>
+          </a:prstGeom>
+          <a:ln w="25400">
+            <a:solidFill>
+              <a:schemeClr val="tx1"/>
+            </a:solidFill>
+          </a:ln>
+        </p:spPr>
+        <p:style>
+          <a:lnRef idx="1">
+            <a:schemeClr val="accent1"/>
+          </a:lnRef>
+          <a:fillRef idx="0">
+            <a:schemeClr val="accent1"/>
+          </a:fillRef>
+          <a:effectRef idx="0">
+            <a:schemeClr val="accent1"/>
+          </a:effectRef>
+          <a:fontRef idx="minor">
+            <a:schemeClr val="tx1"/>
+          </a:fontRef>
+        </p:style>
+      </p:cxnSp>
     </p:spTree>
     <p:extLst>
       <p:ext uri="{BB962C8B-B14F-4D97-AF65-F5344CB8AC3E}">
@@ -6324,8 +7154,8 @@
         </p:nvCxnSpPr>
         <p:spPr>
           <a:xfrm flipH="1" flipV="1">
-            <a:off x="2743200" y="524608"/>
-            <a:ext cx="1" cy="1143000"/>
+            <a:off x="2590800" y="369332"/>
+            <a:ext cx="152402" cy="1298276"/>
           </a:xfrm>
           <a:prstGeom prst="straightConnector1">
             <a:avLst/>
@@ -6357,8 +7187,8 @@
         </p:nvCxnSpPr>
         <p:spPr>
           <a:xfrm flipV="1">
-            <a:off x="3135925" y="524608"/>
-            <a:ext cx="64475" cy="1532792"/>
+            <a:off x="3135925" y="1018470"/>
+            <a:ext cx="64475" cy="1038930"/>
           </a:xfrm>
           <a:prstGeom prst="straightConnector1">
             <a:avLst/>
@@ -6390,8 +7220,8 @@
         </p:nvCxnSpPr>
         <p:spPr>
           <a:xfrm flipV="1">
-            <a:off x="4601300" y="457200"/>
-            <a:ext cx="32237" cy="1360993"/>
+            <a:off x="4601300" y="1018470"/>
+            <a:ext cx="0" cy="799724"/>
           </a:xfrm>
           <a:prstGeom prst="straightConnector1">
             <a:avLst/>
@@ -6441,7 +7271,78 @@
               <a:rPr lang="en-US" dirty="0" smtClean="0"/>
               <a:t>22</a:t>
             </a:r>
-            <a:endParaRPr lang="en-US" dirty="0" smtClean="0"/>
+          </a:p>
+        </p:txBody>
+      </p:sp>
+      <p:sp>
+        <p:nvSpPr>
+          <p:cNvPr id="17" name="TextBox 16"/>
+          <p:cNvSpPr txBox="1"/>
+          <p:nvPr/>
+        </p:nvSpPr>
+        <p:spPr>
+          <a:xfrm>
+            <a:off x="1803562" y="184666"/>
+            <a:ext cx="418704" cy="369332"/>
+          </a:xfrm>
+          <a:prstGeom prst="rect">
+            <a:avLst/>
+          </a:prstGeom>
+          <a:noFill/>
+        </p:spPr>
+        <p:txBody>
+          <a:bodyPr wrap="none" rtlCol="0">
+            <a:spAutoFit/>
+          </a:bodyPr>
+          <a:lstStyle/>
+          <a:p>
+            <a:r>
+              <a:rPr lang="en-US" dirty="0" smtClean="0"/>
+              <a:t>21</a:t>
+            </a:r>
+          </a:p>
+        </p:txBody>
+      </p:sp>
+      <p:sp>
+        <p:nvSpPr>
+          <p:cNvPr id="12" name="TextBox 11"/>
+          <p:cNvSpPr txBox="1"/>
+          <p:nvPr/>
+        </p:nvSpPr>
+        <p:spPr>
+          <a:xfrm>
+            <a:off x="2484189" y="87868"/>
+            <a:ext cx="2925994" cy="369332"/>
+          </a:xfrm>
+          <a:prstGeom prst="rect">
+            <a:avLst/>
+          </a:prstGeom>
+          <a:noFill/>
+          <a:ln w="6350">
+            <a:solidFill>
+              <a:schemeClr val="tx1"/>
+            </a:solidFill>
+          </a:ln>
+        </p:spPr>
+        <p:txBody>
+          <a:bodyPr wrap="none" rtlCol="0">
+            <a:spAutoFit/>
+          </a:bodyPr>
+          <a:lstStyle/>
+          <a:p>
+            <a:r>
+              <a:rPr lang="en-US" dirty="0" smtClean="0"/>
+              <a:t>Counts in channel (</a:t>
+            </a:r>
+            <a:r>
+              <a:rPr lang="en-US" dirty="0" err="1" smtClean="0"/>
+              <a:t>i</a:t>
+            </a:r>
+            <a:r>
+              <a:rPr lang="en-US" dirty="0" smtClean="0"/>
+              <a:t>) angle (j)</a:t>
+            </a:r>
+            <a:endParaRPr lang="en-US" dirty="0"/>
           </a:p>
         </p:txBody>
       </p:sp>
@@ -6850,7 +7751,15 @@
             </a:r>
             <a:r>
               <a:rPr lang="en-US" dirty="0" err="1" smtClean="0"/>
-              <a:t>SrtAv</a:t>
+              <a:t>sRT</a:t>
+            </a:r>
+            <a:r>
+              <a:rPr lang="en-US" dirty="0" err="1"/>
+              <a:t>a</a:t>
+            </a:r>
+            <a:r>
+              <a:rPr lang="en-US" dirty="0" err="1" smtClean="0"/>
+              <a:t>v</a:t>
             </a:r>
             <a:r>
               <a:rPr lang="en-US" dirty="0" smtClean="0"/>
@@ -7445,8 +8354,8 @@
         </p:nvCxnSpPr>
         <p:spPr>
           <a:xfrm flipH="1" flipV="1">
-            <a:off x="609600" y="4269480"/>
-            <a:ext cx="1676400" cy="1732919"/>
+            <a:off x="228599" y="4390531"/>
+            <a:ext cx="2057402" cy="1611870"/>
           </a:xfrm>
           <a:prstGeom prst="straightConnector1">
             <a:avLst/>
@@ -8157,7 +9066,6 @@
               <a:rPr lang="en-US" dirty="0" smtClean="0"/>
               <a:t>22</a:t>
             </a:r>
-            <a:endParaRPr lang="en-US" dirty="0" smtClean="0"/>
           </a:p>
         </p:txBody>
       </p:sp>
@@ -8467,11 +9375,7 @@
             </a:r>
             <a:r>
               <a:rPr lang="en-US" dirty="0" smtClean="0"/>
-              <a:t>) </a:t>
-            </a:r>
-            <a:r>
-              <a:rPr lang="en-US" dirty="0" smtClean="0"/>
-              <a:t>= </a:t>
+              <a:t>) = </a:t>
             </a:r>
             <a:r>
               <a:rPr lang="en-US" dirty="0" err="1" smtClean="0"/>
@@ -8513,11 +9417,7 @@
             </a:r>
             <a:r>
               <a:rPr lang="en-US" dirty="0" smtClean="0"/>
-              <a:t>) &gt; </a:t>
-            </a:r>
-            <a:r>
-              <a:rPr lang="en-US" dirty="0" smtClean="0"/>
-              <a:t>0 (i.e. </a:t>
+              <a:t>) &gt; 0 (i.e. </a:t>
             </a:r>
             <a:r>
               <a:rPr lang="en-US" dirty="0" err="1" smtClean="0"/>
@@ -8920,15 +9820,7 @@
           <a:p>
             <a:r>
               <a:rPr lang="en-US" dirty="0" smtClean="0"/>
-              <a:t>Whole </a:t>
-            </a:r>
-            <a:r>
-              <a:rPr lang="en-US" dirty="0" smtClean="0"/>
-              <a:t>box: </a:t>
-            </a:r>
-            <a:r>
-              <a:rPr lang="en-US" dirty="0" smtClean="0"/>
-              <a:t>24</a:t>
+              <a:t>Whole box: 24</a:t>
             </a:r>
             <a:endParaRPr lang="en-US" dirty="0"/>
           </a:p>

</xml_diff>

<commit_message>
Fixed array dimension information.
git-svn-id: http://svn.eol.ucar.edu/svn/raf/trunk/instruments/mtp@8231 640d5228-2204-0410-8d71-8f46fa6850b4
</commit_message>
<xml_diff>
--- a/doc/MTP-DFD.pptx
+++ b/doc/MTP-DFD.pptx
@@ -311,7 +311,7 @@
           <a:p>
             <a:fld id="{3A6CA703-A109-4933-88E3-8D2081F29780}" type="datetimeFigureOut">
               <a:rPr lang="en-US" smtClean="0"/>
-              <a:t>12/16/2015</a:t>
+              <a:t>2/1/2016</a:t>
             </a:fld>
             <a:endParaRPr lang="en-US"/>
           </a:p>
@@ -481,7 +481,7 @@
           <a:p>
             <a:fld id="{3A6CA703-A109-4933-88E3-8D2081F29780}" type="datetimeFigureOut">
               <a:rPr lang="en-US" smtClean="0"/>
-              <a:t>12/16/2015</a:t>
+              <a:t>2/1/2016</a:t>
             </a:fld>
             <a:endParaRPr lang="en-US"/>
           </a:p>
@@ -661,7 +661,7 @@
           <a:p>
             <a:fld id="{3A6CA703-A109-4933-88E3-8D2081F29780}" type="datetimeFigureOut">
               <a:rPr lang="en-US" smtClean="0"/>
-              <a:t>12/16/2015</a:t>
+              <a:t>2/1/2016</a:t>
             </a:fld>
             <a:endParaRPr lang="en-US"/>
           </a:p>
@@ -831,7 +831,7 @@
           <a:p>
             <a:fld id="{3A6CA703-A109-4933-88E3-8D2081F29780}" type="datetimeFigureOut">
               <a:rPr lang="en-US" smtClean="0"/>
-              <a:t>12/16/2015</a:t>
+              <a:t>2/1/2016</a:t>
             </a:fld>
             <a:endParaRPr lang="en-US"/>
           </a:p>
@@ -1077,7 +1077,7 @@
           <a:p>
             <a:fld id="{3A6CA703-A109-4933-88E3-8D2081F29780}" type="datetimeFigureOut">
               <a:rPr lang="en-US" smtClean="0"/>
-              <a:t>12/16/2015</a:t>
+              <a:t>2/1/2016</a:t>
             </a:fld>
             <a:endParaRPr lang="en-US"/>
           </a:p>
@@ -1365,7 +1365,7 @@
           <a:p>
             <a:fld id="{3A6CA703-A109-4933-88E3-8D2081F29780}" type="datetimeFigureOut">
               <a:rPr lang="en-US" smtClean="0"/>
-              <a:t>12/16/2015</a:t>
+              <a:t>2/1/2016</a:t>
             </a:fld>
             <a:endParaRPr lang="en-US"/>
           </a:p>
@@ -1787,7 +1787,7 @@
           <a:p>
             <a:fld id="{3A6CA703-A109-4933-88E3-8D2081F29780}" type="datetimeFigureOut">
               <a:rPr lang="en-US" smtClean="0"/>
-              <a:t>12/16/2015</a:t>
+              <a:t>2/1/2016</a:t>
             </a:fld>
             <a:endParaRPr lang="en-US"/>
           </a:p>
@@ -1905,7 +1905,7 @@
           <a:p>
             <a:fld id="{3A6CA703-A109-4933-88E3-8D2081F29780}" type="datetimeFigureOut">
               <a:rPr lang="en-US" smtClean="0"/>
-              <a:t>12/16/2015</a:t>
+              <a:t>2/1/2016</a:t>
             </a:fld>
             <a:endParaRPr lang="en-US"/>
           </a:p>
@@ -2000,7 +2000,7 @@
           <a:p>
             <a:fld id="{3A6CA703-A109-4933-88E3-8D2081F29780}" type="datetimeFigureOut">
               <a:rPr lang="en-US" smtClean="0"/>
-              <a:t>12/16/2015</a:t>
+              <a:t>2/1/2016</a:t>
             </a:fld>
             <a:endParaRPr lang="en-US"/>
           </a:p>
@@ -2277,7 +2277,7 @@
           <a:p>
             <a:fld id="{3A6CA703-A109-4933-88E3-8D2081F29780}" type="datetimeFigureOut">
               <a:rPr lang="en-US" smtClean="0"/>
-              <a:t>12/16/2015</a:t>
+              <a:t>2/1/2016</a:t>
             </a:fld>
             <a:endParaRPr lang="en-US"/>
           </a:p>
@@ -2530,7 +2530,7 @@
           <a:p>
             <a:fld id="{3A6CA703-A109-4933-88E3-8D2081F29780}" type="datetimeFigureOut">
               <a:rPr lang="en-US" smtClean="0"/>
-              <a:t>12/16/2015</a:t>
+              <a:t>2/1/2016</a:t>
             </a:fld>
             <a:endParaRPr lang="en-US"/>
           </a:p>
@@ -2743,7 +2743,7 @@
           <a:p>
             <a:fld id="{3A6CA703-A109-4933-88E3-8D2081F29780}" type="datetimeFigureOut">
               <a:rPr lang="en-US" smtClean="0"/>
-              <a:t>12/16/2015</a:t>
+              <a:t>2/1/2016</a:t>
             </a:fld>
             <a:endParaRPr lang="en-US"/>
           </a:p>
@@ -7751,7 +7751,11 @@
           <a:p>
             <a:r>
               <a:rPr lang="en-US" dirty="0" smtClean="0"/>
-              <a:t>33 element array : </a:t>
+              <a:t>31 </a:t>
+            </a:r>
+            <a:r>
+              <a:rPr lang="en-US" dirty="0" smtClean="0"/>
+              <a:t>element array : </a:t>
             </a:r>
             <a:r>
               <a:rPr lang="en-US" dirty="0" err="1" smtClean="0"/>
@@ -11354,11 +11358,7 @@
             <a:p>
               <a:r>
                 <a:rPr lang="en-US" dirty="0" smtClean="0"/>
-                <a:t>(</a:t>
-              </a:r>
-              <a:r>
-                <a:rPr lang="en-US" dirty="0" smtClean="0"/>
-                <a:t>brightness</a:t>
+                <a:t>(brightness</a:t>
               </a:r>
             </a:p>
             <a:p>
@@ -11729,11 +11729,7 @@
           <a:p>
             <a:r>
               <a:rPr lang="en-US" sz="1400" dirty="0" smtClean="0"/>
-              <a:t>A[15,30,33</a:t>
-            </a:r>
-            <a:r>
-              <a:rPr lang="en-US" sz="1400" dirty="0" smtClean="0"/>
-              <a:t>]</a:t>
+              <a:t>A[15,30,33]</a:t>
             </a:r>
             <a:endParaRPr lang="en-US" sz="1400" dirty="0"/>
           </a:p>

</xml_diff>